<commit_message>
Rest or RPC through HTTP2
</commit_message>
<xml_diff>
--- a/Aario-PPT/20160906 IT - 微服务架构师.pptx
+++ b/Aario-PPT/20160906 IT - 微服务架构师.pptx
@@ -8,7 +8,8 @@
     <p:sldId id="256" r:id="rId2"/>
     <p:sldId id="262" r:id="rId3"/>
     <p:sldId id="263" r:id="rId4"/>
-    <p:sldId id="261" r:id="rId5"/>
+    <p:sldId id="264" r:id="rId5"/>
+    <p:sldId id="261" r:id="rId6"/>
   </p:sldIdLst>
   <p:sldSz cx="12192000" cy="6858000"/>
   <p:notesSz cx="6858000" cy="9144000"/>
@@ -157,10 +158,9 @@
           </a:lstStyle>
           <a:p>
             <a:r>
-              <a:rPr lang="zh-CN" altLang="en-US" smtClean="0"/>
+              <a:rPr lang="zh-CN" altLang="en-US"/>
               <a:t>单击此处编辑母版标题样式</a:t>
             </a:r>
-            <a:endParaRPr lang="zh-CN" altLang="en-US"/>
           </a:p>
         </p:txBody>
       </p:sp>
@@ -222,10 +222,9 @@
           </a:lstStyle>
           <a:p>
             <a:r>
-              <a:rPr lang="zh-CN" altLang="en-US" smtClean="0"/>
+              <a:rPr lang="zh-CN" altLang="en-US"/>
               <a:t>单击此处编辑母版副标题样式</a:t>
             </a:r>
-            <a:endParaRPr lang="zh-CN" altLang="en-US"/>
           </a:p>
         </p:txBody>
       </p:sp>
@@ -246,7 +245,7 @@
           <a:p>
             <a:fld id="{CF807A76-DF48-45FF-82F2-1B4E5E1D1AD1}" type="datetimeFigureOut">
               <a:rPr lang="zh-CN" altLang="en-US" smtClean="0"/>
-              <a:t>2016/9/6</a:t>
+              <a:t>2016/9/15</a:t>
             </a:fld>
             <a:endParaRPr lang="zh-CN" altLang="en-US"/>
           </a:p>
@@ -340,10 +339,9 @@
           <a:lstStyle/>
           <a:p>
             <a:r>
-              <a:rPr lang="zh-CN" altLang="en-US" smtClean="0"/>
+              <a:rPr lang="zh-CN" altLang="en-US"/>
               <a:t>单击此处编辑母版标题样式</a:t>
             </a:r>
-            <a:endParaRPr lang="zh-CN" altLang="en-US"/>
           </a:p>
         </p:txBody>
       </p:sp>
@@ -364,38 +362,37 @@
           <a:p>
             <a:pPr lvl="0"/>
             <a:r>
-              <a:rPr lang="zh-CN" altLang="en-US" smtClean="0"/>
+              <a:rPr lang="zh-CN" altLang="en-US"/>
               <a:t>单击此处编辑母版文本样式</a:t>
             </a:r>
           </a:p>
           <a:p>
             <a:pPr lvl="1"/>
             <a:r>
-              <a:rPr lang="zh-CN" altLang="en-US" smtClean="0"/>
+              <a:rPr lang="zh-CN" altLang="en-US"/>
               <a:t>第二级</a:t>
             </a:r>
           </a:p>
           <a:p>
             <a:pPr lvl="2"/>
             <a:r>
-              <a:rPr lang="zh-CN" altLang="en-US" smtClean="0"/>
+              <a:rPr lang="zh-CN" altLang="en-US"/>
               <a:t>第三级</a:t>
             </a:r>
           </a:p>
           <a:p>
             <a:pPr lvl="3"/>
             <a:r>
-              <a:rPr lang="zh-CN" altLang="en-US" smtClean="0"/>
+              <a:rPr lang="zh-CN" altLang="en-US"/>
               <a:t>第四级</a:t>
             </a:r>
           </a:p>
           <a:p>
             <a:pPr lvl="4"/>
             <a:r>
-              <a:rPr lang="zh-CN" altLang="en-US" smtClean="0"/>
+              <a:rPr lang="zh-CN" altLang="en-US"/>
               <a:t>第五级</a:t>
             </a:r>
-            <a:endParaRPr lang="zh-CN" altLang="en-US"/>
           </a:p>
         </p:txBody>
       </p:sp>
@@ -416,7 +413,7 @@
           <a:p>
             <a:fld id="{CF807A76-DF48-45FF-82F2-1B4E5E1D1AD1}" type="datetimeFigureOut">
               <a:rPr lang="zh-CN" altLang="en-US" smtClean="0"/>
-              <a:t>2016/9/6</a:t>
+              <a:t>2016/9/15</a:t>
             </a:fld>
             <a:endParaRPr lang="zh-CN" altLang="en-US"/>
           </a:p>
@@ -515,10 +512,9 @@
           <a:lstStyle/>
           <a:p>
             <a:r>
-              <a:rPr lang="zh-CN" altLang="en-US" smtClean="0"/>
+              <a:rPr lang="zh-CN" altLang="en-US"/>
               <a:t>单击此处编辑母版标题样式</a:t>
             </a:r>
-            <a:endParaRPr lang="zh-CN" altLang="en-US"/>
           </a:p>
         </p:txBody>
       </p:sp>
@@ -544,38 +540,37 @@
           <a:p>
             <a:pPr lvl="0"/>
             <a:r>
-              <a:rPr lang="zh-CN" altLang="en-US" smtClean="0"/>
+              <a:rPr lang="zh-CN" altLang="en-US"/>
               <a:t>单击此处编辑母版文本样式</a:t>
             </a:r>
           </a:p>
           <a:p>
             <a:pPr lvl="1"/>
             <a:r>
-              <a:rPr lang="zh-CN" altLang="en-US" smtClean="0"/>
+              <a:rPr lang="zh-CN" altLang="en-US"/>
               <a:t>第二级</a:t>
             </a:r>
           </a:p>
           <a:p>
             <a:pPr lvl="2"/>
             <a:r>
-              <a:rPr lang="zh-CN" altLang="en-US" smtClean="0"/>
+              <a:rPr lang="zh-CN" altLang="en-US"/>
               <a:t>第三级</a:t>
             </a:r>
           </a:p>
           <a:p>
             <a:pPr lvl="3"/>
             <a:r>
-              <a:rPr lang="zh-CN" altLang="en-US" smtClean="0"/>
+              <a:rPr lang="zh-CN" altLang="en-US"/>
               <a:t>第四级</a:t>
             </a:r>
           </a:p>
           <a:p>
             <a:pPr lvl="4"/>
             <a:r>
-              <a:rPr lang="zh-CN" altLang="en-US" smtClean="0"/>
+              <a:rPr lang="zh-CN" altLang="en-US"/>
               <a:t>第五级</a:t>
             </a:r>
-            <a:endParaRPr lang="zh-CN" altLang="en-US"/>
           </a:p>
         </p:txBody>
       </p:sp>
@@ -596,7 +591,7 @@
           <a:p>
             <a:fld id="{CF807A76-DF48-45FF-82F2-1B4E5E1D1AD1}" type="datetimeFigureOut">
               <a:rPr lang="zh-CN" altLang="en-US" smtClean="0"/>
-              <a:t>2016/9/6</a:t>
+              <a:t>2016/9/15</a:t>
             </a:fld>
             <a:endParaRPr lang="zh-CN" altLang="en-US"/>
           </a:p>
@@ -690,10 +685,9 @@
           <a:lstStyle/>
           <a:p>
             <a:r>
-              <a:rPr lang="zh-CN" altLang="en-US" smtClean="0"/>
+              <a:rPr lang="zh-CN" altLang="en-US"/>
               <a:t>单击此处编辑母版标题样式</a:t>
             </a:r>
-            <a:endParaRPr lang="zh-CN" altLang="en-US"/>
           </a:p>
         </p:txBody>
       </p:sp>
@@ -714,38 +708,37 @@
           <a:p>
             <a:pPr lvl="0"/>
             <a:r>
-              <a:rPr lang="zh-CN" altLang="en-US" smtClean="0"/>
+              <a:rPr lang="zh-CN" altLang="en-US"/>
               <a:t>单击此处编辑母版文本样式</a:t>
             </a:r>
           </a:p>
           <a:p>
             <a:pPr lvl="1"/>
             <a:r>
-              <a:rPr lang="zh-CN" altLang="en-US" smtClean="0"/>
+              <a:rPr lang="zh-CN" altLang="en-US"/>
               <a:t>第二级</a:t>
             </a:r>
           </a:p>
           <a:p>
             <a:pPr lvl="2"/>
             <a:r>
-              <a:rPr lang="zh-CN" altLang="en-US" smtClean="0"/>
+              <a:rPr lang="zh-CN" altLang="en-US"/>
               <a:t>第三级</a:t>
             </a:r>
           </a:p>
           <a:p>
             <a:pPr lvl="3"/>
             <a:r>
-              <a:rPr lang="zh-CN" altLang="en-US" smtClean="0"/>
+              <a:rPr lang="zh-CN" altLang="en-US"/>
               <a:t>第四级</a:t>
             </a:r>
           </a:p>
           <a:p>
             <a:pPr lvl="4"/>
             <a:r>
-              <a:rPr lang="zh-CN" altLang="en-US" smtClean="0"/>
+              <a:rPr lang="zh-CN" altLang="en-US"/>
               <a:t>第五级</a:t>
             </a:r>
-            <a:endParaRPr lang="zh-CN" altLang="en-US"/>
           </a:p>
         </p:txBody>
       </p:sp>
@@ -766,7 +759,7 @@
           <a:p>
             <a:fld id="{CF807A76-DF48-45FF-82F2-1B4E5E1D1AD1}" type="datetimeFigureOut">
               <a:rPr lang="zh-CN" altLang="en-US" smtClean="0"/>
-              <a:t>2016/9/6</a:t>
+              <a:t>2016/9/15</a:t>
             </a:fld>
             <a:endParaRPr lang="zh-CN" altLang="en-US"/>
           </a:p>
@@ -869,10 +862,9 @@
           </a:lstStyle>
           <a:p>
             <a:r>
-              <a:rPr lang="zh-CN" altLang="en-US" smtClean="0"/>
+              <a:rPr lang="zh-CN" altLang="en-US"/>
               <a:t>单击此处编辑母版标题样式</a:t>
             </a:r>
-            <a:endParaRPr lang="zh-CN" altLang="en-US"/>
           </a:p>
         </p:txBody>
       </p:sp>
@@ -989,7 +981,7 @@
           <a:p>
             <a:pPr lvl="0"/>
             <a:r>
-              <a:rPr lang="zh-CN" altLang="en-US" smtClean="0"/>
+              <a:rPr lang="zh-CN" altLang="en-US"/>
               <a:t>单击此处编辑母版文本样式</a:t>
             </a:r>
           </a:p>
@@ -1012,7 +1004,7 @@
           <a:p>
             <a:fld id="{CF807A76-DF48-45FF-82F2-1B4E5E1D1AD1}" type="datetimeFigureOut">
               <a:rPr lang="zh-CN" altLang="en-US" smtClean="0"/>
-              <a:t>2016/9/6</a:t>
+              <a:t>2016/9/15</a:t>
             </a:fld>
             <a:endParaRPr lang="zh-CN" altLang="en-US"/>
           </a:p>
@@ -1106,10 +1098,9 @@
           <a:lstStyle/>
           <a:p>
             <a:r>
-              <a:rPr lang="zh-CN" altLang="en-US" smtClean="0"/>
+              <a:rPr lang="zh-CN" altLang="en-US"/>
               <a:t>单击此处编辑母版标题样式</a:t>
             </a:r>
-            <a:endParaRPr lang="zh-CN" altLang="en-US"/>
           </a:p>
         </p:txBody>
       </p:sp>
@@ -1135,38 +1126,37 @@
           <a:p>
             <a:pPr lvl="0"/>
             <a:r>
-              <a:rPr lang="zh-CN" altLang="en-US" smtClean="0"/>
+              <a:rPr lang="zh-CN" altLang="en-US"/>
               <a:t>单击此处编辑母版文本样式</a:t>
             </a:r>
           </a:p>
           <a:p>
             <a:pPr lvl="1"/>
             <a:r>
-              <a:rPr lang="zh-CN" altLang="en-US" smtClean="0"/>
+              <a:rPr lang="zh-CN" altLang="en-US"/>
               <a:t>第二级</a:t>
             </a:r>
           </a:p>
           <a:p>
             <a:pPr lvl="2"/>
             <a:r>
-              <a:rPr lang="zh-CN" altLang="en-US" smtClean="0"/>
+              <a:rPr lang="zh-CN" altLang="en-US"/>
               <a:t>第三级</a:t>
             </a:r>
           </a:p>
           <a:p>
             <a:pPr lvl="3"/>
             <a:r>
-              <a:rPr lang="zh-CN" altLang="en-US" smtClean="0"/>
+              <a:rPr lang="zh-CN" altLang="en-US"/>
               <a:t>第四级</a:t>
             </a:r>
           </a:p>
           <a:p>
             <a:pPr lvl="4"/>
             <a:r>
-              <a:rPr lang="zh-CN" altLang="en-US" smtClean="0"/>
+              <a:rPr lang="zh-CN" altLang="en-US"/>
               <a:t>第五级</a:t>
             </a:r>
-            <a:endParaRPr lang="zh-CN" altLang="en-US"/>
           </a:p>
         </p:txBody>
       </p:sp>
@@ -1192,38 +1182,37 @@
           <a:p>
             <a:pPr lvl="0"/>
             <a:r>
-              <a:rPr lang="zh-CN" altLang="en-US" smtClean="0"/>
+              <a:rPr lang="zh-CN" altLang="en-US"/>
               <a:t>单击此处编辑母版文本样式</a:t>
             </a:r>
           </a:p>
           <a:p>
             <a:pPr lvl="1"/>
             <a:r>
-              <a:rPr lang="zh-CN" altLang="en-US" smtClean="0"/>
+              <a:rPr lang="zh-CN" altLang="en-US"/>
               <a:t>第二级</a:t>
             </a:r>
           </a:p>
           <a:p>
             <a:pPr lvl="2"/>
             <a:r>
-              <a:rPr lang="zh-CN" altLang="en-US" smtClean="0"/>
+              <a:rPr lang="zh-CN" altLang="en-US"/>
               <a:t>第三级</a:t>
             </a:r>
           </a:p>
           <a:p>
             <a:pPr lvl="3"/>
             <a:r>
-              <a:rPr lang="zh-CN" altLang="en-US" smtClean="0"/>
+              <a:rPr lang="zh-CN" altLang="en-US"/>
               <a:t>第四级</a:t>
             </a:r>
           </a:p>
           <a:p>
             <a:pPr lvl="4"/>
             <a:r>
-              <a:rPr lang="zh-CN" altLang="en-US" smtClean="0"/>
+              <a:rPr lang="zh-CN" altLang="en-US"/>
               <a:t>第五级</a:t>
             </a:r>
-            <a:endParaRPr lang="zh-CN" altLang="en-US"/>
           </a:p>
         </p:txBody>
       </p:sp>
@@ -1244,7 +1233,7 @@
           <a:p>
             <a:fld id="{CF807A76-DF48-45FF-82F2-1B4E5E1D1AD1}" type="datetimeFigureOut">
               <a:rPr lang="zh-CN" altLang="en-US" smtClean="0"/>
-              <a:t>2016/9/6</a:t>
+              <a:t>2016/9/15</a:t>
             </a:fld>
             <a:endParaRPr lang="zh-CN" altLang="en-US"/>
           </a:p>
@@ -1343,10 +1332,9 @@
           <a:lstStyle/>
           <a:p>
             <a:r>
-              <a:rPr lang="zh-CN" altLang="en-US" smtClean="0"/>
+              <a:rPr lang="zh-CN" altLang="en-US"/>
               <a:t>单击此处编辑母版标题样式</a:t>
             </a:r>
-            <a:endParaRPr lang="zh-CN" altLang="en-US"/>
           </a:p>
         </p:txBody>
       </p:sp>
@@ -1409,7 +1397,7 @@
           <a:p>
             <a:pPr lvl="0"/>
             <a:r>
-              <a:rPr lang="zh-CN" altLang="en-US" smtClean="0"/>
+              <a:rPr lang="zh-CN" altLang="en-US"/>
               <a:t>单击此处编辑母版文本样式</a:t>
             </a:r>
           </a:p>
@@ -1437,38 +1425,37 @@
           <a:p>
             <a:pPr lvl="0"/>
             <a:r>
-              <a:rPr lang="zh-CN" altLang="en-US" smtClean="0"/>
+              <a:rPr lang="zh-CN" altLang="en-US"/>
               <a:t>单击此处编辑母版文本样式</a:t>
             </a:r>
           </a:p>
           <a:p>
             <a:pPr lvl="1"/>
             <a:r>
-              <a:rPr lang="zh-CN" altLang="en-US" smtClean="0"/>
+              <a:rPr lang="zh-CN" altLang="en-US"/>
               <a:t>第二级</a:t>
             </a:r>
           </a:p>
           <a:p>
             <a:pPr lvl="2"/>
             <a:r>
-              <a:rPr lang="zh-CN" altLang="en-US" smtClean="0"/>
+              <a:rPr lang="zh-CN" altLang="en-US"/>
               <a:t>第三级</a:t>
             </a:r>
           </a:p>
           <a:p>
             <a:pPr lvl="3"/>
             <a:r>
-              <a:rPr lang="zh-CN" altLang="en-US" smtClean="0"/>
+              <a:rPr lang="zh-CN" altLang="en-US"/>
               <a:t>第四级</a:t>
             </a:r>
           </a:p>
           <a:p>
             <a:pPr lvl="4"/>
             <a:r>
-              <a:rPr lang="zh-CN" altLang="en-US" smtClean="0"/>
+              <a:rPr lang="zh-CN" altLang="en-US"/>
               <a:t>第五级</a:t>
             </a:r>
-            <a:endParaRPr lang="zh-CN" altLang="en-US"/>
           </a:p>
         </p:txBody>
       </p:sp>
@@ -1531,7 +1518,7 @@
           <a:p>
             <a:pPr lvl="0"/>
             <a:r>
-              <a:rPr lang="zh-CN" altLang="en-US" smtClean="0"/>
+              <a:rPr lang="zh-CN" altLang="en-US"/>
               <a:t>单击此处编辑母版文本样式</a:t>
             </a:r>
           </a:p>
@@ -1559,38 +1546,37 @@
           <a:p>
             <a:pPr lvl="0"/>
             <a:r>
-              <a:rPr lang="zh-CN" altLang="en-US" smtClean="0"/>
+              <a:rPr lang="zh-CN" altLang="en-US"/>
               <a:t>单击此处编辑母版文本样式</a:t>
             </a:r>
           </a:p>
           <a:p>
             <a:pPr lvl="1"/>
             <a:r>
-              <a:rPr lang="zh-CN" altLang="en-US" smtClean="0"/>
+              <a:rPr lang="zh-CN" altLang="en-US"/>
               <a:t>第二级</a:t>
             </a:r>
           </a:p>
           <a:p>
             <a:pPr lvl="2"/>
             <a:r>
-              <a:rPr lang="zh-CN" altLang="en-US" smtClean="0"/>
+              <a:rPr lang="zh-CN" altLang="en-US"/>
               <a:t>第三级</a:t>
             </a:r>
           </a:p>
           <a:p>
             <a:pPr lvl="3"/>
             <a:r>
-              <a:rPr lang="zh-CN" altLang="en-US" smtClean="0"/>
+              <a:rPr lang="zh-CN" altLang="en-US"/>
               <a:t>第四级</a:t>
             </a:r>
           </a:p>
           <a:p>
             <a:pPr lvl="4"/>
             <a:r>
-              <a:rPr lang="zh-CN" altLang="en-US" smtClean="0"/>
+              <a:rPr lang="zh-CN" altLang="en-US"/>
               <a:t>第五级</a:t>
             </a:r>
-            <a:endParaRPr lang="zh-CN" altLang="en-US"/>
           </a:p>
         </p:txBody>
       </p:sp>
@@ -1611,7 +1597,7 @@
           <a:p>
             <a:fld id="{CF807A76-DF48-45FF-82F2-1B4E5E1D1AD1}" type="datetimeFigureOut">
               <a:rPr lang="zh-CN" altLang="en-US" smtClean="0"/>
-              <a:t>2016/9/6</a:t>
+              <a:t>2016/9/15</a:t>
             </a:fld>
             <a:endParaRPr lang="zh-CN" altLang="en-US"/>
           </a:p>
@@ -1705,10 +1691,9 @@
           <a:lstStyle/>
           <a:p>
             <a:r>
-              <a:rPr lang="zh-CN" altLang="en-US" smtClean="0"/>
+              <a:rPr lang="zh-CN" altLang="en-US"/>
               <a:t>单击此处编辑母版标题样式</a:t>
             </a:r>
-            <a:endParaRPr lang="zh-CN" altLang="en-US"/>
           </a:p>
         </p:txBody>
       </p:sp>
@@ -1729,7 +1714,7 @@
           <a:p>
             <a:fld id="{CF807A76-DF48-45FF-82F2-1B4E5E1D1AD1}" type="datetimeFigureOut">
               <a:rPr lang="zh-CN" altLang="en-US" smtClean="0"/>
-              <a:t>2016/9/6</a:t>
+              <a:t>2016/9/15</a:t>
             </a:fld>
             <a:endParaRPr lang="zh-CN" altLang="en-US"/>
           </a:p>
@@ -1824,7 +1809,7 @@
           <a:p>
             <a:fld id="{CF807A76-DF48-45FF-82F2-1B4E5E1D1AD1}" type="datetimeFigureOut">
               <a:rPr lang="zh-CN" altLang="en-US" smtClean="0"/>
-              <a:t>2016/9/6</a:t>
+              <a:t>2016/9/15</a:t>
             </a:fld>
             <a:endParaRPr lang="zh-CN" altLang="en-US"/>
           </a:p>
@@ -1927,10 +1912,9 @@
           </a:lstStyle>
           <a:p>
             <a:r>
-              <a:rPr lang="zh-CN" altLang="en-US" smtClean="0"/>
+              <a:rPr lang="zh-CN" altLang="en-US"/>
               <a:t>单击此处编辑母版标题样式</a:t>
             </a:r>
-            <a:endParaRPr lang="zh-CN" altLang="en-US"/>
           </a:p>
         </p:txBody>
       </p:sp>
@@ -1984,38 +1968,37 @@
           <a:p>
             <a:pPr lvl="0"/>
             <a:r>
-              <a:rPr lang="zh-CN" altLang="en-US" smtClean="0"/>
+              <a:rPr lang="zh-CN" altLang="en-US"/>
               <a:t>单击此处编辑母版文本样式</a:t>
             </a:r>
           </a:p>
           <a:p>
             <a:pPr lvl="1"/>
             <a:r>
-              <a:rPr lang="zh-CN" altLang="en-US" smtClean="0"/>
+              <a:rPr lang="zh-CN" altLang="en-US"/>
               <a:t>第二级</a:t>
             </a:r>
           </a:p>
           <a:p>
             <a:pPr lvl="2"/>
             <a:r>
-              <a:rPr lang="zh-CN" altLang="en-US" smtClean="0"/>
+              <a:rPr lang="zh-CN" altLang="en-US"/>
               <a:t>第三级</a:t>
             </a:r>
           </a:p>
           <a:p>
             <a:pPr lvl="3"/>
             <a:r>
-              <a:rPr lang="zh-CN" altLang="en-US" smtClean="0"/>
+              <a:rPr lang="zh-CN" altLang="en-US"/>
               <a:t>第四级</a:t>
             </a:r>
           </a:p>
           <a:p>
             <a:pPr lvl="4"/>
             <a:r>
-              <a:rPr lang="zh-CN" altLang="en-US" smtClean="0"/>
+              <a:rPr lang="zh-CN" altLang="en-US"/>
               <a:t>第五级</a:t>
             </a:r>
-            <a:endParaRPr lang="zh-CN" altLang="en-US"/>
           </a:p>
         </p:txBody>
       </p:sp>
@@ -2078,7 +2061,7 @@
           <a:p>
             <a:pPr lvl="0"/>
             <a:r>
-              <a:rPr lang="zh-CN" altLang="en-US" smtClean="0"/>
+              <a:rPr lang="zh-CN" altLang="en-US"/>
               <a:t>单击此处编辑母版文本样式</a:t>
             </a:r>
           </a:p>
@@ -2101,7 +2084,7 @@
           <a:p>
             <a:fld id="{CF807A76-DF48-45FF-82F2-1B4E5E1D1AD1}" type="datetimeFigureOut">
               <a:rPr lang="zh-CN" altLang="en-US" smtClean="0"/>
-              <a:t>2016/9/6</a:t>
+              <a:t>2016/9/15</a:t>
             </a:fld>
             <a:endParaRPr lang="zh-CN" altLang="en-US"/>
           </a:p>
@@ -2204,10 +2187,9 @@
           </a:lstStyle>
           <a:p>
             <a:r>
-              <a:rPr lang="zh-CN" altLang="en-US" smtClean="0"/>
+              <a:rPr lang="zh-CN" altLang="en-US"/>
               <a:t>单击此处编辑母版标题样式</a:t>
             </a:r>
-            <a:endParaRPr lang="zh-CN" altLang="en-US"/>
           </a:p>
         </p:txBody>
       </p:sp>
@@ -2331,7 +2313,7 @@
           <a:p>
             <a:pPr lvl="0"/>
             <a:r>
-              <a:rPr lang="zh-CN" altLang="en-US" smtClean="0"/>
+              <a:rPr lang="zh-CN" altLang="en-US"/>
               <a:t>单击此处编辑母版文本样式</a:t>
             </a:r>
           </a:p>
@@ -2354,7 +2336,7 @@
           <a:p>
             <a:fld id="{CF807A76-DF48-45FF-82F2-1B4E5E1D1AD1}" type="datetimeFigureOut">
               <a:rPr lang="zh-CN" altLang="en-US" smtClean="0"/>
-              <a:t>2016/9/6</a:t>
+              <a:t>2016/9/15</a:t>
             </a:fld>
             <a:endParaRPr lang="zh-CN" altLang="en-US"/>
           </a:p>
@@ -2463,10 +2445,9 @@
           <a:lstStyle/>
           <a:p>
             <a:r>
-              <a:rPr lang="zh-CN" altLang="en-US" smtClean="0"/>
+              <a:rPr lang="zh-CN" altLang="en-US"/>
               <a:t>单击此处编辑母版标题样式</a:t>
             </a:r>
-            <a:endParaRPr lang="zh-CN" altLang="en-US"/>
           </a:p>
         </p:txBody>
       </p:sp>
@@ -2497,38 +2478,37 @@
           <a:p>
             <a:pPr lvl="0"/>
             <a:r>
-              <a:rPr lang="zh-CN" altLang="en-US" smtClean="0"/>
+              <a:rPr lang="zh-CN" altLang="en-US"/>
               <a:t>单击此处编辑母版文本样式</a:t>
             </a:r>
           </a:p>
           <a:p>
             <a:pPr lvl="1"/>
             <a:r>
-              <a:rPr lang="zh-CN" altLang="en-US" smtClean="0"/>
+              <a:rPr lang="zh-CN" altLang="en-US"/>
               <a:t>第二级</a:t>
             </a:r>
           </a:p>
           <a:p>
             <a:pPr lvl="2"/>
             <a:r>
-              <a:rPr lang="zh-CN" altLang="en-US" smtClean="0"/>
+              <a:rPr lang="zh-CN" altLang="en-US"/>
               <a:t>第三级</a:t>
             </a:r>
           </a:p>
           <a:p>
             <a:pPr lvl="3"/>
             <a:r>
-              <a:rPr lang="zh-CN" altLang="en-US" smtClean="0"/>
+              <a:rPr lang="zh-CN" altLang="en-US"/>
               <a:t>第四级</a:t>
             </a:r>
           </a:p>
           <a:p>
             <a:pPr lvl="4"/>
             <a:r>
-              <a:rPr lang="zh-CN" altLang="en-US" smtClean="0"/>
+              <a:rPr lang="zh-CN" altLang="en-US"/>
               <a:t>第五级</a:t>
             </a:r>
-            <a:endParaRPr lang="zh-CN" altLang="en-US"/>
           </a:p>
         </p:txBody>
       </p:sp>
@@ -2567,7 +2547,7 @@
           <a:p>
             <a:fld id="{CF807A76-DF48-45FF-82F2-1B4E5E1D1AD1}" type="datetimeFigureOut">
               <a:rPr lang="zh-CN" altLang="en-US" smtClean="0"/>
-              <a:t>2016/9/6</a:t>
+              <a:t>2016/9/15</a:t>
             </a:fld>
             <a:endParaRPr lang="zh-CN" altLang="en-US"/>
           </a:p>
@@ -3042,7 +3022,7 @@
           <a:lstStyle/>
           <a:p>
             <a:r>
-              <a:rPr lang="zh-CN" altLang="en-US" dirty="0" smtClean="0">
+              <a:rPr lang="zh-CN" altLang="en-US" dirty="0">
                 <a:solidFill>
                   <a:schemeClr val="bg1"/>
                 </a:solidFill>
@@ -3051,6 +3031,49 @@
               </a:rPr>
               <a:t>微服务架构师</a:t>
             </a:r>
+          </a:p>
+        </p:txBody>
+      </p:sp>
+      <p:sp>
+        <p:nvSpPr>
+          <p:cNvPr id="3" name="副标题 2"/>
+          <p:cNvSpPr>
+            <a:spLocks noGrp="1"/>
+          </p:cNvSpPr>
+          <p:nvPr>
+            <p:ph type="subTitle" idx="1"/>
+          </p:nvPr>
+        </p:nvSpPr>
+        <p:spPr>
+          <a:xfrm>
+            <a:off x="2774833" y="5605284"/>
+            <a:ext cx="9144000" cy="461004"/>
+          </a:xfrm>
+        </p:spPr>
+        <p:txBody>
+          <a:bodyPr/>
+          <a:lstStyle/>
+          <a:p>
+            <a:r>
+              <a:rPr lang="en-US" altLang="zh-CN" dirty="0" err="1">
+                <a:solidFill>
+                  <a:schemeClr val="bg1"/>
+                </a:solidFill>
+                <a:latin typeface=".黑体-韩语" panose="02010601040101010101" pitchFamily="2" charset="-122"/>
+                <a:ea typeface=".黑体-韩语" panose="02010601040101010101" pitchFamily="2" charset="-122"/>
+              </a:rPr>
+              <a:t>Microservices</a:t>
+            </a:r>
+            <a:r>
+              <a:rPr lang="en-US" altLang="zh-CN" dirty="0">
+                <a:solidFill>
+                  <a:schemeClr val="bg1"/>
+                </a:solidFill>
+                <a:latin typeface=".黑体-韩语" panose="02010601040101010101" pitchFamily="2" charset="-122"/>
+                <a:ea typeface=".黑体-韩语" panose="02010601040101010101" pitchFamily="2" charset="-122"/>
+              </a:rPr>
+              <a:t> Architect</a:t>
+            </a:r>
             <a:endParaRPr lang="zh-CN" altLang="en-US" dirty="0">
               <a:solidFill>
                 <a:schemeClr val="bg1"/>
@@ -3063,56 +3086,6 @@
       </p:sp>
       <p:sp>
         <p:nvSpPr>
-          <p:cNvPr id="3" name="副标题 2"/>
-          <p:cNvSpPr>
-            <a:spLocks noGrp="1"/>
-          </p:cNvSpPr>
-          <p:nvPr>
-            <p:ph type="subTitle" idx="1"/>
-          </p:nvPr>
-        </p:nvSpPr>
-        <p:spPr>
-          <a:xfrm>
-            <a:off x="2774833" y="5605284"/>
-            <a:ext cx="9144000" cy="461004"/>
-          </a:xfrm>
-        </p:spPr>
-        <p:txBody>
-          <a:bodyPr/>
-          <a:lstStyle/>
-          <a:p>
-            <a:r>
-              <a:rPr lang="en-US" altLang="zh-CN" dirty="0" err="1" smtClean="0">
-                <a:solidFill>
-                  <a:schemeClr val="bg1"/>
-                </a:solidFill>
-                <a:latin typeface=".黑体-韩语" panose="02010601040101010101" pitchFamily="2" charset="-122"/>
-                <a:ea typeface=".黑体-韩语" panose="02010601040101010101" pitchFamily="2" charset="-122"/>
-              </a:rPr>
-              <a:t>Microservices</a:t>
-            </a:r>
-            <a:r>
-              <a:rPr lang="en-US" altLang="zh-CN" dirty="0" smtClean="0">
-                <a:solidFill>
-                  <a:schemeClr val="bg1"/>
-                </a:solidFill>
-                <a:latin typeface=".黑体-韩语" panose="02010601040101010101" pitchFamily="2" charset="-122"/>
-                <a:ea typeface=".黑体-韩语" panose="02010601040101010101" pitchFamily="2" charset="-122"/>
-              </a:rPr>
-              <a:t> Architect</a:t>
-            </a:r>
-            <a:endParaRPr lang="zh-CN" altLang="en-US" dirty="0">
-              <a:solidFill>
-                <a:schemeClr val="bg1"/>
-              </a:solidFill>
-              <a:latin typeface=".黑体-韩语" panose="02010601040101010101" pitchFamily="2" charset="-122"/>
-              <a:ea typeface=".黑体-韩语" panose="02010601040101010101" pitchFamily="2" charset="-122"/>
-            </a:endParaRPr>
-          </a:p>
-        </p:txBody>
-      </p:sp>
-      <p:sp>
-        <p:nvSpPr>
           <p:cNvPr id="5" name="文本框 4"/>
           <p:cNvSpPr txBox="1"/>
           <p:nvPr/>
@@ -3135,7 +3108,7 @@
           <a:p>
             <a:pPr algn="just"/>
             <a:r>
-              <a:rPr lang="en-US" altLang="zh-CN" sz="1100" dirty="0" err="1" smtClean="0">
+              <a:rPr lang="en-US" altLang="zh-CN" sz="1100" dirty="0" err="1">
                 <a:solidFill>
                   <a:schemeClr val="bg1"/>
                 </a:solidFill>
@@ -3173,7 +3146,7 @@
           <a:lstStyle/>
           <a:p>
             <a:r>
-              <a:rPr lang="en-US" altLang="zh-CN" sz="1100" dirty="0" err="1" smtClean="0">
+              <a:rPr lang="en-US" altLang="zh-CN" sz="1100" dirty="0" err="1">
                 <a:solidFill>
                   <a:schemeClr val="bg1"/>
                 </a:solidFill>
@@ -3211,7 +3184,7 @@
           <a:lstStyle/>
           <a:p>
             <a:r>
-              <a:rPr lang="en-US" altLang="zh-CN" sz="800" dirty="0" err="1" smtClean="0">
+              <a:rPr lang="en-US" altLang="zh-CN" sz="800" dirty="0" err="1">
                 <a:solidFill>
                   <a:schemeClr val="bg1"/>
                 </a:solidFill>
@@ -3249,7 +3222,7 @@
           <a:lstStyle/>
           <a:p>
             <a:r>
-              <a:rPr lang="en-US" altLang="zh-CN" sz="2000" dirty="0" smtClean="0">
+              <a:rPr lang="en-US" altLang="zh-CN" sz="2000" dirty="0">
                 <a:solidFill>
                   <a:schemeClr val="bg1"/>
                 </a:solidFill>
@@ -3287,7 +3260,7 @@
           <a:lstStyle/>
           <a:p>
             <a:r>
-              <a:rPr lang="en-US" altLang="zh-CN" sz="1100" dirty="0" err="1" smtClean="0">
+              <a:rPr lang="en-US" altLang="zh-CN" sz="1100" dirty="0" err="1">
                 <a:solidFill>
                   <a:schemeClr val="bg1"/>
                 </a:solidFill>
@@ -3326,7 +3299,7 @@
           <a:p>
             <a:pPr algn="just"/>
             <a:r>
-              <a:rPr lang="en-US" altLang="zh-CN" sz="1100" dirty="0" err="1" smtClean="0">
+              <a:rPr lang="en-US" altLang="zh-CN" sz="1100" dirty="0" err="1">
                 <a:solidFill>
                   <a:schemeClr val="bg1"/>
                 </a:solidFill>
@@ -3365,7 +3338,7 @@
           <a:p>
             <a:pPr algn="just"/>
             <a:r>
-              <a:rPr lang="en-US" altLang="zh-CN" sz="1100" dirty="0" smtClean="0">
+              <a:rPr lang="en-US" altLang="zh-CN" sz="1100" dirty="0">
                 <a:solidFill>
                   <a:schemeClr val="bg1"/>
                 </a:solidFill>
@@ -3404,7 +3377,7 @@
           <a:p>
             <a:pPr algn="just"/>
             <a:r>
-              <a:rPr lang="en-US" altLang="zh-CN" sz="800" dirty="0" smtClean="0">
+              <a:rPr lang="en-US" altLang="zh-CN" sz="800" dirty="0">
                 <a:solidFill>
                   <a:schemeClr val="bg1"/>
                 </a:solidFill>
@@ -3442,7 +3415,7 @@
           <a:lstStyle/>
           <a:p>
             <a:r>
-              <a:rPr lang="en-US" altLang="zh-CN" sz="1100" dirty="0" err="1" smtClean="0">
+              <a:rPr lang="en-US" altLang="zh-CN" sz="1100" dirty="0" err="1">
                 <a:solidFill>
                   <a:schemeClr val="bg1"/>
                 </a:solidFill>
@@ -3481,7 +3454,7 @@
           <a:p>
             <a:pPr algn="just"/>
             <a:r>
-              <a:rPr lang="en-US" altLang="zh-CN" sz="2000" dirty="0" err="1" smtClean="0">
+              <a:rPr lang="en-US" altLang="zh-CN" sz="2000" dirty="0" err="1">
                 <a:solidFill>
                   <a:schemeClr val="bg1"/>
                 </a:solidFill>
@@ -3520,7 +3493,7 @@
           <a:p>
             <a:pPr algn="just"/>
             <a:r>
-              <a:rPr lang="en-US" altLang="zh-CN" dirty="0" smtClean="0">
+              <a:rPr lang="en-US" altLang="zh-CN" dirty="0">
                 <a:solidFill>
                   <a:schemeClr val="bg1"/>
                 </a:solidFill>
@@ -3559,7 +3532,7 @@
           <a:p>
             <a:pPr algn="just"/>
             <a:r>
-              <a:rPr lang="en-US" altLang="zh-CN" dirty="0" smtClean="0">
+              <a:rPr lang="en-US" altLang="zh-CN" dirty="0">
                 <a:solidFill>
                   <a:schemeClr val="bg1"/>
                 </a:solidFill>
@@ -3598,7 +3571,7 @@
           <a:p>
             <a:pPr algn="just"/>
             <a:r>
-              <a:rPr lang="en-US" altLang="zh-CN" dirty="0" smtClean="0">
+              <a:rPr lang="en-US" altLang="zh-CN" dirty="0">
                 <a:solidFill>
                   <a:schemeClr val="bg1"/>
                 </a:solidFill>
@@ -3637,7 +3610,7 @@
           <a:p>
             <a:pPr algn="just"/>
             <a:r>
-              <a:rPr lang="en-US" altLang="zh-CN" sz="1100" dirty="0" err="1" smtClean="0">
+              <a:rPr lang="en-US" altLang="zh-CN" sz="1100" dirty="0" err="1">
                 <a:solidFill>
                   <a:schemeClr val="bg1"/>
                 </a:solidFill>
@@ -3676,7 +3649,7 @@
           <a:p>
             <a:pPr algn="just"/>
             <a:r>
-              <a:rPr lang="en-US" altLang="zh-CN" sz="1100" dirty="0" err="1" smtClean="0">
+              <a:rPr lang="en-US" altLang="zh-CN" sz="1100" dirty="0" err="1">
                 <a:solidFill>
                   <a:schemeClr val="bg1"/>
                 </a:solidFill>
@@ -3714,7 +3687,7 @@
           <a:lstStyle/>
           <a:p>
             <a:r>
-              <a:rPr lang="en-US" altLang="zh-CN" sz="3600" dirty="0" smtClean="0">
+              <a:rPr lang="en-US" altLang="zh-CN" sz="3600" dirty="0">
                 <a:solidFill>
                   <a:schemeClr val="bg1"/>
                 </a:solidFill>
@@ -3779,16 +3752,12 @@
           <a:lstStyle/>
           <a:p>
             <a:r>
-              <a:rPr lang="zh-CN" altLang="en-US" dirty="0" smtClean="0">
+              <a:rPr lang="zh-CN" altLang="en-US" dirty="0">
                 <a:latin typeface=".黑体-韩语" panose="02010601040101010101" pitchFamily="2" charset="-122"/>
                 <a:ea typeface=".黑体-韩语" panose="02010601040101010101" pitchFamily="2" charset="-122"/>
               </a:rPr>
-              <a:t>架构师</a:t>
-            </a:r>
-            <a:endParaRPr lang="zh-CN" altLang="en-US" dirty="0">
-              <a:latin typeface=".黑体-韩语" panose="02010601040101010101" pitchFamily="2" charset="-122"/>
-              <a:ea typeface=".黑体-韩语" panose="02010601040101010101" pitchFamily="2" charset="-122"/>
-            </a:endParaRPr>
+              <a:t>演进式架构师</a:t>
+            </a:r>
           </a:p>
         </p:txBody>
       </p:sp>
@@ -3805,50 +3774,61 @@
         <p:spPr>
           <a:xfrm>
             <a:off x="838200" y="1825625"/>
-            <a:ext cx="10515600" cy="1717675"/>
-          </a:xfrm>
-        </p:spPr>
-        <p:txBody>
-          <a:bodyPr/>
-          <a:lstStyle/>
-          <a:p>
-            <a:r>
-              <a:rPr lang="zh-CN" altLang="en-US" dirty="0" smtClean="0">
+            <a:ext cx="10515600" cy="3634271"/>
+          </a:xfrm>
+        </p:spPr>
+        <p:txBody>
+          <a:bodyPr>
+            <a:normAutofit/>
+          </a:bodyPr>
+          <a:lstStyle/>
+          <a:p>
+            <a:r>
+              <a:rPr lang="zh-CN" altLang="en-US" dirty="0">
                 <a:latin typeface="Microsoft YaHei UI" panose="020B0503020204020204" pitchFamily="34" charset="-122"/>
                 <a:ea typeface="Microsoft YaHei UI" panose="020B0503020204020204" pitchFamily="34" charset="-122"/>
               </a:rPr>
               <a:t>负责团队技术愿景，保证架构适合团队人员</a:t>
             </a:r>
-            <a:endParaRPr lang="en-US" altLang="zh-CN" dirty="0" smtClean="0">
+            <a:endParaRPr lang="en-US" altLang="zh-CN" dirty="0">
               <a:latin typeface="Microsoft YaHei UI" panose="020B0503020204020204" pitchFamily="34" charset="-122"/>
               <a:ea typeface="Microsoft YaHei UI" panose="020B0503020204020204" pitchFamily="34" charset="-122"/>
             </a:endParaRPr>
           </a:p>
           <a:p>
             <a:r>
-              <a:rPr lang="zh-CN" altLang="en-US" dirty="0" smtClean="0">
+              <a:rPr lang="zh-CN" altLang="en-US" dirty="0">
                 <a:latin typeface="Microsoft YaHei UI" panose="020B0503020204020204" pitchFamily="34" charset="-122"/>
                 <a:ea typeface="Microsoft YaHei UI" panose="020B0503020204020204" pitchFamily="34" charset="-122"/>
               </a:rPr>
               <a:t>协调多个团队</a:t>
             </a:r>
-            <a:endParaRPr lang="en-US" altLang="zh-CN" dirty="0" smtClean="0">
+            <a:endParaRPr lang="en-US" altLang="zh-CN" dirty="0">
               <a:latin typeface="Microsoft YaHei UI" panose="020B0503020204020204" pitchFamily="34" charset="-122"/>
               <a:ea typeface="Microsoft YaHei UI" panose="020B0503020204020204" pitchFamily="34" charset="-122"/>
             </a:endParaRPr>
           </a:p>
           <a:p>
             <a:r>
-              <a:rPr lang="zh-CN" altLang="en-US" dirty="0" smtClean="0">
+              <a:rPr lang="zh-CN" altLang="en-US" dirty="0">
                 <a:latin typeface="Microsoft YaHei UI" panose="020B0503020204020204" pitchFamily="34" charset="-122"/>
                 <a:ea typeface="Microsoft YaHei UI" panose="020B0503020204020204" pitchFamily="34" charset="-122"/>
               </a:rPr>
               <a:t>根据高层的战略目标，确立技术原则及实践方案</a:t>
             </a:r>
-            <a:endParaRPr lang="zh-CN" altLang="en-US" dirty="0">
+            <a:endParaRPr lang="en-US" altLang="zh-CN" dirty="0">
               <a:latin typeface="Microsoft YaHei UI" panose="020B0503020204020204" pitchFamily="34" charset="-122"/>
               <a:ea typeface="Microsoft YaHei UI" panose="020B0503020204020204" pitchFamily="34" charset="-122"/>
             </a:endParaRPr>
+          </a:p>
+          <a:p>
+            <a:r>
+              <a:rPr lang="zh-CN" altLang="en-US" dirty="0">
+                <a:latin typeface="Microsoft YaHei UI" panose="020B0503020204020204" pitchFamily="34" charset="-122"/>
+                <a:ea typeface="Microsoft YaHei UI" panose="020B0503020204020204" pitchFamily="34" charset="-122"/>
+              </a:rPr>
+              <a:t>平衡标准和团队自治</a:t>
+            </a:r>
           </a:p>
         </p:txBody>
       </p:sp>
@@ -3875,16 +3855,12 @@
           <a:lstStyle/>
           <a:p>
             <a:r>
-              <a:rPr lang="zh-CN" altLang="en-US" dirty="0" smtClean="0">
+              <a:rPr lang="zh-CN" altLang="en-US" dirty="0">
                 <a:latin typeface=".黑体-韩语" panose="02010601040101010101" pitchFamily="2" charset="-122"/>
                 <a:ea typeface=".黑体-韩语" panose="02010601040101010101" pitchFamily="2" charset="-122"/>
               </a:rPr>
               <a:t>规则，智者视为指导，庸人只会照做。</a:t>
             </a:r>
-            <a:endParaRPr lang="zh-CN" altLang="en-US" dirty="0">
-              <a:latin typeface=".黑体-韩语" panose="02010601040101010101" pitchFamily="2" charset="-122"/>
-              <a:ea typeface=".黑体-韩语" panose="02010601040101010101" pitchFamily="2" charset="-122"/>
-            </a:endParaRPr>
           </a:p>
         </p:txBody>
       </p:sp>
@@ -3981,7 +3957,7 @@
           <a:lstStyle/>
           <a:p>
             <a:r>
-              <a:rPr lang="zh-CN" altLang="en-US" sz="2400" b="1" dirty="0" smtClean="0">
+              <a:rPr lang="zh-CN" altLang="en-US" sz="2400" b="1" dirty="0">
                 <a:solidFill>
                   <a:schemeClr val="bg1"/>
                 </a:solidFill>
@@ -3990,13 +3966,6 @@
               </a:rPr>
               <a:t>战略目标</a:t>
             </a:r>
-            <a:endParaRPr lang="zh-CN" altLang="en-US" sz="2400" b="1" dirty="0">
-              <a:solidFill>
-                <a:schemeClr val="bg1"/>
-              </a:solidFill>
-              <a:latin typeface=".黑体-韩语" panose="02010601040101010101" pitchFamily="2" charset="-122"/>
-              <a:ea typeface=".黑体-韩语" panose="02010601040101010101" pitchFamily="2" charset="-122"/>
-            </a:endParaRPr>
           </a:p>
         </p:txBody>
       </p:sp>
@@ -4035,16 +4004,12 @@
           <a:p>
             <a:pPr algn="ctr"/>
             <a:r>
-              <a:rPr lang="zh-CN" altLang="en-US" dirty="0" smtClean="0">
+              <a:rPr lang="zh-CN" altLang="en-US" dirty="0">
                 <a:latin typeface="Microsoft YaHei UI" panose="020B0503020204020204" pitchFamily="34" charset="-122"/>
                 <a:ea typeface="Microsoft YaHei UI" panose="020B0503020204020204" pitchFamily="34" charset="-122"/>
               </a:rPr>
               <a:t>缩短新功能上线周期</a:t>
             </a:r>
-            <a:endParaRPr lang="zh-CN" altLang="en-US" dirty="0">
-              <a:latin typeface="Microsoft YaHei UI" panose="020B0503020204020204" pitchFamily="34" charset="-122"/>
-              <a:ea typeface="Microsoft YaHei UI" panose="020B0503020204020204" pitchFamily="34" charset="-122"/>
-            </a:endParaRPr>
           </a:p>
         </p:txBody>
       </p:sp>
@@ -4111,7 +4076,7 @@
           <a:lstStyle/>
           <a:p>
             <a:r>
-              <a:rPr lang="zh-CN" altLang="en-US" sz="2400" b="1" dirty="0" smtClean="0">
+              <a:rPr lang="zh-CN" altLang="en-US" sz="2400" b="1" dirty="0">
                 <a:solidFill>
                   <a:schemeClr val="bg1"/>
                 </a:solidFill>
@@ -4120,13 +4085,6 @@
               </a:rPr>
               <a:t>架构原则</a:t>
             </a:r>
-            <a:endParaRPr lang="zh-CN" altLang="en-US" sz="2400" b="1" dirty="0">
-              <a:solidFill>
-                <a:schemeClr val="bg1"/>
-              </a:solidFill>
-              <a:latin typeface=".黑体-韩语" panose="02010601040101010101" pitchFamily="2" charset="-122"/>
-              <a:ea typeface=".黑体-韩语" panose="02010601040101010101" pitchFamily="2" charset="-122"/>
-            </a:endParaRPr>
           </a:p>
         </p:txBody>
       </p:sp>
@@ -4165,16 +4123,12 @@
           <a:p>
             <a:pPr algn="ctr"/>
             <a:r>
-              <a:rPr lang="zh-CN" altLang="en-US" dirty="0" smtClean="0">
+              <a:rPr lang="zh-CN" altLang="en-US" dirty="0">
                 <a:latin typeface="Microsoft YaHei UI" panose="020B0503020204020204" pitchFamily="34" charset="-122"/>
                 <a:ea typeface="Microsoft YaHei UI" panose="020B0503020204020204" pitchFamily="34" charset="-122"/>
               </a:rPr>
               <a:t>拥有整个软件生命周期的完全控制权</a:t>
             </a:r>
-            <a:endParaRPr lang="zh-CN" altLang="en-US" dirty="0">
-              <a:latin typeface="Microsoft YaHei UI" panose="020B0503020204020204" pitchFamily="34" charset="-122"/>
-              <a:ea typeface="Microsoft YaHei UI" panose="020B0503020204020204" pitchFamily="34" charset="-122"/>
-            </a:endParaRPr>
           </a:p>
         </p:txBody>
       </p:sp>
@@ -4241,7 +4195,7 @@
           <a:lstStyle/>
           <a:p>
             <a:r>
-              <a:rPr lang="zh-CN" altLang="en-US" sz="2400" b="1" dirty="0" smtClean="0">
+              <a:rPr lang="zh-CN" altLang="en-US" sz="2400" b="1" dirty="0">
                 <a:solidFill>
                   <a:schemeClr val="bg1"/>
                 </a:solidFill>
@@ -4250,13 +4204,6 @@
               </a:rPr>
               <a:t>实践方案</a:t>
             </a:r>
-            <a:endParaRPr lang="zh-CN" altLang="en-US" sz="2400" b="1" dirty="0">
-              <a:solidFill>
-                <a:schemeClr val="bg1"/>
-              </a:solidFill>
-              <a:latin typeface=".黑体-韩语" panose="02010601040101010101" pitchFamily="2" charset="-122"/>
-              <a:ea typeface=".黑体-韩语" panose="02010601040101010101" pitchFamily="2" charset="-122"/>
-            </a:endParaRPr>
           </a:p>
         </p:txBody>
       </p:sp>
@@ -4295,7 +4242,7 @@
           <a:p>
             <a:pPr algn="ctr"/>
             <a:r>
-              <a:rPr lang="en-US" altLang="zh-CN" dirty="0" smtClean="0">
+              <a:rPr lang="en-US" altLang="zh-CN" dirty="0">
                 <a:latin typeface="Microsoft YaHei UI" panose="020B0503020204020204" pitchFamily="34" charset="-122"/>
                 <a:ea typeface="Microsoft YaHei UI" panose="020B0503020204020204" pitchFamily="34" charset="-122"/>
               </a:rPr>
@@ -4343,16 +4290,12 @@
           <a:p>
             <a:pPr algn="ctr"/>
             <a:r>
-              <a:rPr lang="zh-CN" altLang="en-US" dirty="0" smtClean="0">
+              <a:rPr lang="zh-CN" altLang="en-US" dirty="0">
                 <a:latin typeface="Microsoft YaHei UI" panose="020B0503020204020204" pitchFamily="34" charset="-122"/>
                 <a:ea typeface="Microsoft YaHei UI" panose="020B0503020204020204" pitchFamily="34" charset="-122"/>
               </a:rPr>
               <a:t>支持进入新市场</a:t>
             </a:r>
-            <a:endParaRPr lang="zh-CN" altLang="en-US" dirty="0">
-              <a:latin typeface="Microsoft YaHei UI" panose="020B0503020204020204" pitchFamily="34" charset="-122"/>
-              <a:ea typeface="Microsoft YaHei UI" panose="020B0503020204020204" pitchFamily="34" charset="-122"/>
-            </a:endParaRPr>
           </a:p>
         </p:txBody>
       </p:sp>
@@ -4391,16 +4334,12 @@
           <a:p>
             <a:pPr algn="ctr"/>
             <a:r>
-              <a:rPr lang="zh-CN" altLang="en-US" dirty="0" smtClean="0">
+              <a:rPr lang="zh-CN" altLang="en-US" dirty="0">
                 <a:latin typeface="Microsoft YaHei UI" panose="020B0503020204020204" pitchFamily="34" charset="-122"/>
                 <a:ea typeface="Microsoft YaHei UI" panose="020B0503020204020204" pitchFamily="34" charset="-122"/>
               </a:rPr>
               <a:t>服务部署到该地区</a:t>
             </a:r>
-            <a:endParaRPr lang="zh-CN" altLang="en-US" dirty="0">
-              <a:latin typeface="Microsoft YaHei UI" panose="020B0503020204020204" pitchFamily="34" charset="-122"/>
-              <a:ea typeface="Microsoft YaHei UI" panose="020B0503020204020204" pitchFamily="34" charset="-122"/>
-            </a:endParaRPr>
           </a:p>
         </p:txBody>
       </p:sp>
@@ -4514,16 +4453,12 @@
           <a:p>
             <a:pPr algn="ctr"/>
             <a:r>
-              <a:rPr lang="zh-CN" altLang="en-US" dirty="0" smtClean="0">
+              <a:rPr lang="zh-CN" altLang="en-US" dirty="0">
                 <a:latin typeface="Microsoft YaHei UI" panose="020B0503020204020204" pitchFamily="34" charset="-122"/>
                 <a:ea typeface="Microsoft YaHei UI" panose="020B0503020204020204" pitchFamily="34" charset="-122"/>
               </a:rPr>
               <a:t>标准化，接口一致性</a:t>
             </a:r>
-            <a:endParaRPr lang="zh-CN" altLang="en-US" dirty="0">
-              <a:latin typeface="Microsoft YaHei UI" panose="020B0503020204020204" pitchFamily="34" charset="-122"/>
-              <a:ea typeface="Microsoft YaHei UI" panose="020B0503020204020204" pitchFamily="34" charset="-122"/>
-            </a:endParaRPr>
           </a:p>
         </p:txBody>
       </p:sp>
@@ -4601,16 +4536,12 @@
           <a:p>
             <a:pPr algn="ctr"/>
             <a:r>
-              <a:rPr lang="zh-CN" altLang="en-US" dirty="0" smtClean="0">
+              <a:rPr lang="zh-CN" altLang="en-US" dirty="0">
                 <a:latin typeface="Microsoft YaHei UI" panose="020B0503020204020204" pitchFamily="34" charset="-122"/>
                 <a:ea typeface="Microsoft YaHei UI" panose="020B0503020204020204" pitchFamily="34" charset="-122"/>
               </a:rPr>
               <a:t>减小惯性，减少依赖</a:t>
             </a:r>
-            <a:endParaRPr lang="zh-CN" altLang="en-US" dirty="0">
-              <a:latin typeface="Microsoft YaHei UI" panose="020B0503020204020204" pitchFamily="34" charset="-122"/>
-              <a:ea typeface="Microsoft YaHei UI" panose="020B0503020204020204" pitchFamily="34" charset="-122"/>
-            </a:endParaRPr>
           </a:p>
         </p:txBody>
       </p:sp>
@@ -4649,16 +4580,12 @@
           <a:p>
             <a:pPr algn="ctr"/>
             <a:r>
-              <a:rPr lang="zh-CN" altLang="en-US" dirty="0" smtClean="0">
+              <a:rPr lang="zh-CN" altLang="en-US" dirty="0">
                 <a:latin typeface="Microsoft YaHei UI" panose="020B0503020204020204" pitchFamily="34" charset="-122"/>
                 <a:ea typeface="Microsoft YaHei UI" panose="020B0503020204020204" pitchFamily="34" charset="-122"/>
               </a:rPr>
               <a:t>微服务</a:t>
             </a:r>
-            <a:endParaRPr lang="zh-CN" altLang="en-US" dirty="0">
-              <a:latin typeface="Microsoft YaHei UI" panose="020B0503020204020204" pitchFamily="34" charset="-122"/>
-              <a:ea typeface="Microsoft YaHei UI" panose="020B0503020204020204" pitchFamily="34" charset="-122"/>
-            </a:endParaRPr>
           </a:p>
         </p:txBody>
       </p:sp>
@@ -4697,16 +4624,12 @@
           <a:p>
             <a:pPr algn="ctr"/>
             <a:r>
-              <a:rPr lang="zh-CN" altLang="en-US" dirty="0" smtClean="0">
+              <a:rPr lang="zh-CN" altLang="en-US" dirty="0">
                 <a:latin typeface="Microsoft YaHei UI" panose="020B0503020204020204" pitchFamily="34" charset="-122"/>
                 <a:ea typeface="Microsoft YaHei UI" panose="020B0503020204020204" pitchFamily="34" charset="-122"/>
               </a:rPr>
               <a:t>持续部署</a:t>
             </a:r>
-            <a:endParaRPr lang="zh-CN" altLang="en-US" dirty="0">
-              <a:latin typeface="Microsoft YaHei UI" panose="020B0503020204020204" pitchFamily="34" charset="-122"/>
-              <a:ea typeface="Microsoft YaHei UI" panose="020B0503020204020204" pitchFamily="34" charset="-122"/>
-            </a:endParaRPr>
           </a:p>
         </p:txBody>
       </p:sp>
@@ -4745,16 +4668,12 @@
           <a:p>
             <a:pPr algn="ctr"/>
             <a:r>
-              <a:rPr lang="zh-CN" altLang="en-US" dirty="0" smtClean="0">
+              <a:rPr lang="zh-CN" altLang="en-US" dirty="0">
                 <a:latin typeface="Microsoft YaHei UI" panose="020B0503020204020204" pitchFamily="34" charset="-122"/>
                 <a:ea typeface="Microsoft YaHei UI" panose="020B0503020204020204" pitchFamily="34" charset="-122"/>
               </a:rPr>
               <a:t>消除集成数据库</a:t>
             </a:r>
-            <a:endParaRPr lang="zh-CN" altLang="en-US" dirty="0">
-              <a:latin typeface="Microsoft YaHei UI" panose="020B0503020204020204" pitchFamily="34" charset="-122"/>
-              <a:ea typeface="Microsoft YaHei UI" panose="020B0503020204020204" pitchFamily="34" charset="-122"/>
-            </a:endParaRPr>
           </a:p>
         </p:txBody>
       </p:sp>
@@ -4898,16 +4817,12 @@
           <a:p>
             <a:pPr algn="ctr"/>
             <a:r>
-              <a:rPr lang="zh-CN" altLang="en-US" dirty="0" smtClean="0">
+              <a:rPr lang="zh-CN" altLang="en-US" dirty="0">
                 <a:latin typeface="Microsoft YaHei UI" panose="020B0503020204020204" pitchFamily="34" charset="-122"/>
                 <a:ea typeface="Microsoft YaHei UI" panose="020B0503020204020204" pitchFamily="34" charset="-122"/>
               </a:rPr>
               <a:t>大数据</a:t>
             </a:r>
-            <a:endParaRPr lang="zh-CN" altLang="en-US" dirty="0">
-              <a:latin typeface="Microsoft YaHei UI" panose="020B0503020204020204" pitchFamily="34" charset="-122"/>
-              <a:ea typeface="Microsoft YaHei UI" panose="020B0503020204020204" pitchFamily="34" charset="-122"/>
-            </a:endParaRPr>
           </a:p>
         </p:txBody>
       </p:sp>
@@ -4946,16 +4861,12 @@
           <a:p>
             <a:pPr algn="ctr"/>
             <a:r>
-              <a:rPr lang="zh-CN" altLang="en-US" dirty="0" smtClean="0">
+              <a:rPr lang="zh-CN" altLang="en-US" dirty="0">
                 <a:latin typeface="Microsoft YaHei UI" panose="020B0503020204020204" pitchFamily="34" charset="-122"/>
                 <a:ea typeface="Microsoft YaHei UI" panose="020B0503020204020204" pitchFamily="34" charset="-122"/>
               </a:rPr>
               <a:t>详细且独立的日志</a:t>
             </a:r>
-            <a:endParaRPr lang="zh-CN" altLang="en-US" dirty="0">
-              <a:latin typeface="Microsoft YaHei UI" panose="020B0503020204020204" pitchFamily="34" charset="-122"/>
-              <a:ea typeface="Microsoft YaHei UI" panose="020B0503020204020204" pitchFamily="34" charset="-122"/>
-            </a:endParaRPr>
           </a:p>
         </p:txBody>
       </p:sp>
@@ -4994,30 +4905,26 @@
           <a:p>
             <a:pPr algn="ctr"/>
             <a:r>
-              <a:rPr lang="en-US" altLang="zh-CN" dirty="0" err="1" smtClean="0">
+              <a:rPr lang="en-US" altLang="zh-CN" dirty="0" err="1">
                 <a:latin typeface="Microsoft YaHei UI" panose="020B0503020204020204" pitchFamily="34" charset="-122"/>
                 <a:ea typeface="Microsoft YaHei UI" panose="020B0503020204020204" pitchFamily="34" charset="-122"/>
               </a:rPr>
               <a:t>Zooper</a:t>
             </a:r>
             <a:r>
-              <a:rPr lang="en-US" altLang="zh-CN" dirty="0" smtClean="0">
+              <a:rPr lang="en-US" altLang="zh-CN" dirty="0">
                 <a:latin typeface="Microsoft YaHei UI" panose="020B0503020204020204" pitchFamily="34" charset="-122"/>
                 <a:ea typeface="Microsoft YaHei UI" panose="020B0503020204020204" pitchFamily="34" charset="-122"/>
               </a:rPr>
               <a:t> + Kafka </a:t>
             </a:r>
             <a:r>
-              <a:rPr lang="zh-CN" altLang="en-US" dirty="0" smtClean="0">
+              <a:rPr lang="zh-CN" altLang="en-US" dirty="0">
                 <a:latin typeface="Microsoft YaHei UI" panose="020B0503020204020204" pitchFamily="34" charset="-122"/>
                 <a:ea typeface="Microsoft YaHei UI" panose="020B0503020204020204" pitchFamily="34" charset="-122"/>
               </a:rPr>
               <a:t>日志</a:t>
             </a:r>
-            <a:endParaRPr lang="zh-CN" altLang="en-US" dirty="0">
-              <a:latin typeface="Microsoft YaHei UI" panose="020B0503020204020204" pitchFamily="34" charset="-122"/>
-              <a:ea typeface="Microsoft YaHei UI" panose="020B0503020204020204" pitchFamily="34" charset="-122"/>
-            </a:endParaRPr>
           </a:p>
         </p:txBody>
       </p:sp>
@@ -5056,7 +4963,7 @@
           <a:p>
             <a:pPr algn="ctr"/>
             <a:r>
-              <a:rPr lang="en-US" altLang="zh-CN" dirty="0" smtClean="0">
+              <a:rPr lang="en-US" altLang="zh-CN" dirty="0">
                 <a:latin typeface="Microsoft YaHei UI" panose="020B0503020204020204" pitchFamily="34" charset="-122"/>
                 <a:ea typeface="Microsoft YaHei UI" panose="020B0503020204020204" pitchFamily="34" charset="-122"/>
               </a:rPr>
@@ -5217,6 +5124,79 @@
       </p:grpSpPr>
       <p:sp>
         <p:nvSpPr>
+          <p:cNvPr id="5" name="TextBox 4"/>
+          <p:cNvSpPr txBox="1"/>
+          <p:nvPr/>
+        </p:nvSpPr>
+        <p:spPr>
+          <a:xfrm>
+            <a:off x="2305879" y="2464904"/>
+            <a:ext cx="7103165" cy="646331"/>
+          </a:xfrm>
+          <a:prstGeom prst="rect">
+            <a:avLst/>
+          </a:prstGeom>
+          <a:noFill/>
+        </p:spPr>
+        <p:txBody>
+          <a:bodyPr wrap="square" rtlCol="0">
+            <a:spAutoFit/>
+          </a:bodyPr>
+          <a:lstStyle/>
+          <a:p>
+            <a:r>
+              <a:rPr lang="zh-CN" altLang="en-US" dirty="0">
+                <a:latin typeface="Microsoft JhengHei" panose="020B0604030504040204" pitchFamily="34" charset="-120"/>
+                <a:ea typeface="Microsoft JhengHei" panose="020B0604030504040204" pitchFamily="34" charset="-120"/>
+              </a:rPr>
+              <a:t>系统应该由很多小而有自治生命周期的组件组成，在优化单个服务自治性的同时，也要兼顾全局。</a:t>
+            </a:r>
+            <a:r>
+              <a:rPr lang="en-US" altLang="zh-CN" dirty="0">
+                <a:latin typeface="Microsoft JhengHei" panose="020B0604030504040204" pitchFamily="34" charset="-120"/>
+                <a:ea typeface="Microsoft JhengHei" panose="020B0604030504040204" pitchFamily="34" charset="-120"/>
+              </a:rPr>
+              <a:t>		</a:t>
+            </a:r>
+            <a:endParaRPr lang="en-US" dirty="0">
+              <a:latin typeface="Microsoft JhengHei" panose="020B0604030504040204" pitchFamily="34" charset="-120"/>
+              <a:ea typeface="Microsoft JhengHei" panose="020B0604030504040204" pitchFamily="34" charset="-120"/>
+            </a:endParaRPr>
+          </a:p>
+        </p:txBody>
+      </p:sp>
+    </p:spTree>
+    <p:extLst>
+      <p:ext uri="{BB962C8B-B14F-4D97-AF65-F5344CB8AC3E}">
+        <p14:creationId xmlns:p14="http://schemas.microsoft.com/office/powerpoint/2010/main" val="2679076917"/>
+      </p:ext>
+    </p:extLst>
+  </p:cSld>
+  <p:clrMapOvr>
+    <a:masterClrMapping/>
+  </p:clrMapOvr>
+</p:sld>
+</file>
+
+<file path=ppt/slides/slide5.xml><?xml version="1.0" encoding="utf-8"?>
+<p:sld xmlns:a="http://schemas.openxmlformats.org/drawingml/2006/main" xmlns:r="http://schemas.openxmlformats.org/officeDocument/2006/relationships" xmlns:p="http://schemas.openxmlformats.org/presentationml/2006/main">
+  <p:cSld>
+    <p:spTree>
+      <p:nvGrpSpPr>
+        <p:cNvPr id="1" name=""/>
+        <p:cNvGrpSpPr/>
+        <p:nvPr/>
+      </p:nvGrpSpPr>
+      <p:grpSpPr>
+        <a:xfrm>
+          <a:off x="0" y="0"/>
+          <a:ext cx="0" cy="0"/>
+          <a:chOff x="0" y="0"/>
+          <a:chExt cx="0" cy="0"/>
+        </a:xfrm>
+      </p:grpSpPr>
+      <p:sp>
+        <p:nvSpPr>
           <p:cNvPr id="2" name="标题 1"/>
           <p:cNvSpPr>
             <a:spLocks noGrp="1"/>
@@ -5236,16 +5216,12 @@
           <a:lstStyle/>
           <a:p>
             <a:r>
-              <a:rPr lang="zh-CN" altLang="en-US" dirty="0" smtClean="0">
+              <a:rPr lang="zh-CN" altLang="en-US" dirty="0">
                 <a:latin typeface=".黑体-韩语" panose="02010601040101010101" pitchFamily="2" charset="-122"/>
                 <a:ea typeface=".黑体-韩语" panose="02010601040101010101" pitchFamily="2" charset="-122"/>
               </a:rPr>
               <a:t>未完待续</a:t>
             </a:r>
-            <a:endParaRPr lang="zh-CN" altLang="en-US" dirty="0">
-              <a:latin typeface=".黑体-韩语" panose="02010601040101010101" pitchFamily="2" charset="-122"/>
-              <a:ea typeface=".黑体-韩语" panose="02010601040101010101" pitchFamily="2" charset="-122"/>
-            </a:endParaRPr>
           </a:p>
         </p:txBody>
       </p:sp>

</xml_diff>